<commit_message>
Working on social vertex.
</commit_message>
<xml_diff>
--- a/figure_other/Figures.pptx
+++ b/figure_other/Figures.pptx
@@ -8,7 +8,8 @@
     <p:sldId id="256" r:id="rId2"/>
     <p:sldId id="257" r:id="rId3"/>
     <p:sldId id="258" r:id="rId4"/>
-    <p:sldId id="259" r:id="rId5"/>
+    <p:sldId id="260" r:id="rId5"/>
+    <p:sldId id="259" r:id="rId6"/>
   </p:sldIdLst>
   <p:sldSz cx="12192000" cy="6858000"/>
   <p:notesSz cx="6858000" cy="9144000"/>
@@ -262,7 +263,7 @@
           <a:p>
             <a:fld id="{1E04A9E4-0FF4-C74B-8B5D-7D66FD201CEB}" type="datetimeFigureOut">
               <a:rPr lang="en-US" smtClean="0"/>
-              <a:t>4/23/19</a:t>
+              <a:t>4/25/19</a:t>
             </a:fld>
             <a:endParaRPr lang="en-US"/>
           </a:p>
@@ -460,7 +461,7 @@
           <a:p>
             <a:fld id="{1E04A9E4-0FF4-C74B-8B5D-7D66FD201CEB}" type="datetimeFigureOut">
               <a:rPr lang="en-US" smtClean="0"/>
-              <a:t>4/23/19</a:t>
+              <a:t>4/25/19</a:t>
             </a:fld>
             <a:endParaRPr lang="en-US"/>
           </a:p>
@@ -668,7 +669,7 @@
           <a:p>
             <a:fld id="{1E04A9E4-0FF4-C74B-8B5D-7D66FD201CEB}" type="datetimeFigureOut">
               <a:rPr lang="en-US" smtClean="0"/>
-              <a:t>4/23/19</a:t>
+              <a:t>4/25/19</a:t>
             </a:fld>
             <a:endParaRPr lang="en-US"/>
           </a:p>
@@ -866,7 +867,7 @@
           <a:p>
             <a:fld id="{1E04A9E4-0FF4-C74B-8B5D-7D66FD201CEB}" type="datetimeFigureOut">
               <a:rPr lang="en-US" smtClean="0"/>
-              <a:t>4/23/19</a:t>
+              <a:t>4/25/19</a:t>
             </a:fld>
             <a:endParaRPr lang="en-US"/>
           </a:p>
@@ -1141,7 +1142,7 @@
           <a:p>
             <a:fld id="{1E04A9E4-0FF4-C74B-8B5D-7D66FD201CEB}" type="datetimeFigureOut">
               <a:rPr lang="en-US" smtClean="0"/>
-              <a:t>4/23/19</a:t>
+              <a:t>4/25/19</a:t>
             </a:fld>
             <a:endParaRPr lang="en-US"/>
           </a:p>
@@ -1406,7 +1407,7 @@
           <a:p>
             <a:fld id="{1E04A9E4-0FF4-C74B-8B5D-7D66FD201CEB}" type="datetimeFigureOut">
               <a:rPr lang="en-US" smtClean="0"/>
-              <a:t>4/23/19</a:t>
+              <a:t>4/25/19</a:t>
             </a:fld>
             <a:endParaRPr lang="en-US"/>
           </a:p>
@@ -1818,7 +1819,7 @@
           <a:p>
             <a:fld id="{1E04A9E4-0FF4-C74B-8B5D-7D66FD201CEB}" type="datetimeFigureOut">
               <a:rPr lang="en-US" smtClean="0"/>
-              <a:t>4/23/19</a:t>
+              <a:t>4/25/19</a:t>
             </a:fld>
             <a:endParaRPr lang="en-US"/>
           </a:p>
@@ -1959,7 +1960,7 @@
           <a:p>
             <a:fld id="{1E04A9E4-0FF4-C74B-8B5D-7D66FD201CEB}" type="datetimeFigureOut">
               <a:rPr lang="en-US" smtClean="0"/>
-              <a:t>4/23/19</a:t>
+              <a:t>4/25/19</a:t>
             </a:fld>
             <a:endParaRPr lang="en-US"/>
           </a:p>
@@ -2072,7 +2073,7 @@
           <a:p>
             <a:fld id="{1E04A9E4-0FF4-C74B-8B5D-7D66FD201CEB}" type="datetimeFigureOut">
               <a:rPr lang="en-US" smtClean="0"/>
-              <a:t>4/23/19</a:t>
+              <a:t>4/25/19</a:t>
             </a:fld>
             <a:endParaRPr lang="en-US"/>
           </a:p>
@@ -2383,7 +2384,7 @@
           <a:p>
             <a:fld id="{1E04A9E4-0FF4-C74B-8B5D-7D66FD201CEB}" type="datetimeFigureOut">
               <a:rPr lang="en-US" smtClean="0"/>
-              <a:t>4/23/19</a:t>
+              <a:t>4/25/19</a:t>
             </a:fld>
             <a:endParaRPr lang="en-US"/>
           </a:p>
@@ -2671,7 +2672,7 @@
           <a:p>
             <a:fld id="{1E04A9E4-0FF4-C74B-8B5D-7D66FD201CEB}" type="datetimeFigureOut">
               <a:rPr lang="en-US" smtClean="0"/>
-              <a:t>4/23/19</a:t>
+              <a:t>4/25/19</a:t>
             </a:fld>
             <a:endParaRPr lang="en-US"/>
           </a:p>
@@ -2912,7 +2913,7 @@
           <a:p>
             <a:fld id="{1E04A9E4-0FF4-C74B-8B5D-7D66FD201CEB}" type="datetimeFigureOut">
               <a:rPr lang="en-US" smtClean="0"/>
-              <a:t>4/23/19</a:t>
+              <a:t>4/25/19</a:t>
             </a:fld>
             <a:endParaRPr lang="en-US"/>
           </a:p>
@@ -4165,128 +4166,6 @@
           </a:fontRef>
         </p:style>
       </p:cxnSp>
-      <p:sp>
-        <p:nvSpPr>
-          <p:cNvPr id="24" name="TextBox 23">
-            <a:extLst>
-              <a:ext uri="{FF2B5EF4-FFF2-40B4-BE49-F238E27FC236}">
-                <a16:creationId xmlns:a16="http://schemas.microsoft.com/office/drawing/2014/main" id="{DC4CC64C-F18A-7348-8216-1650E341F102}"/>
-              </a:ext>
-            </a:extLst>
-          </p:cNvPr>
-          <p:cNvSpPr txBox="1"/>
-          <p:nvPr/>
-        </p:nvSpPr>
-        <p:spPr>
-          <a:xfrm>
-            <a:off x="4851282" y="4748617"/>
-            <a:ext cx="2182650" cy="461665"/>
-          </a:xfrm>
-          <a:prstGeom prst="rect">
-            <a:avLst/>
-          </a:prstGeom>
-          <a:noFill/>
-        </p:spPr>
-        <p:txBody>
-          <a:bodyPr wrap="none" rtlCol="0">
-            <a:spAutoFit/>
-          </a:bodyPr>
-          <a:lstStyle/>
-          <a:p>
-            <a:pPr algn="ctr"/>
-            <a:r>
-              <a:rPr lang="en-US" sz="2400" dirty="0"/>
-              <a:t>Socioeconomics</a:t>
-            </a:r>
-          </a:p>
-        </p:txBody>
-      </p:sp>
-      <p:sp>
-        <p:nvSpPr>
-          <p:cNvPr id="25" name="TextBox 24">
-            <a:extLst>
-              <a:ext uri="{FF2B5EF4-FFF2-40B4-BE49-F238E27FC236}">
-                <a16:creationId xmlns:a16="http://schemas.microsoft.com/office/drawing/2014/main" id="{989C5124-2802-AD49-8376-757FC8E5D2C5}"/>
-              </a:ext>
-            </a:extLst>
-          </p:cNvPr>
-          <p:cNvSpPr txBox="1"/>
-          <p:nvPr/>
-        </p:nvSpPr>
-        <p:spPr>
-          <a:xfrm rot="3363220">
-            <a:off x="6352332" y="2699145"/>
-            <a:ext cx="2003369" cy="830997"/>
-          </a:xfrm>
-          <a:prstGeom prst="rect">
-            <a:avLst/>
-          </a:prstGeom>
-          <a:noFill/>
-        </p:spPr>
-        <p:txBody>
-          <a:bodyPr wrap="none" rtlCol="0">
-            <a:spAutoFit/>
-          </a:bodyPr>
-          <a:lstStyle/>
-          <a:p>
-            <a:pPr algn="ctr"/>
-            <a:r>
-              <a:rPr lang="en-US" sz="2400" dirty="0"/>
-              <a:t>Environmental</a:t>
-            </a:r>
-          </a:p>
-          <a:p>
-            <a:pPr algn="ctr"/>
-            <a:r>
-              <a:rPr lang="en-US" sz="2400" dirty="0"/>
-              <a:t>Sociology</a:t>
-            </a:r>
-          </a:p>
-        </p:txBody>
-      </p:sp>
-      <p:sp>
-        <p:nvSpPr>
-          <p:cNvPr id="26" name="TextBox 25">
-            <a:extLst>
-              <a:ext uri="{FF2B5EF4-FFF2-40B4-BE49-F238E27FC236}">
-                <a16:creationId xmlns:a16="http://schemas.microsoft.com/office/drawing/2014/main" id="{A0AFE7E9-40B2-1549-BC81-15EB96C74D4C}"/>
-              </a:ext>
-            </a:extLst>
-          </p:cNvPr>
-          <p:cNvSpPr txBox="1"/>
-          <p:nvPr/>
-        </p:nvSpPr>
-        <p:spPr>
-          <a:xfrm rot="18177679">
-            <a:off x="3546952" y="2722765"/>
-            <a:ext cx="2003369" cy="830997"/>
-          </a:xfrm>
-          <a:prstGeom prst="rect">
-            <a:avLst/>
-          </a:prstGeom>
-          <a:noFill/>
-        </p:spPr>
-        <p:txBody>
-          <a:bodyPr wrap="none" rtlCol="0">
-            <a:spAutoFit/>
-          </a:bodyPr>
-          <a:lstStyle/>
-          <a:p>
-            <a:pPr algn="ctr"/>
-            <a:r>
-              <a:rPr lang="en-US" sz="2400" dirty="0"/>
-              <a:t>Environmental</a:t>
-            </a:r>
-          </a:p>
-          <a:p>
-            <a:pPr algn="ctr"/>
-            <a:r>
-              <a:rPr lang="en-US" sz="2400" dirty="0"/>
-              <a:t>Economics</a:t>
-            </a:r>
-          </a:p>
-        </p:txBody>
-      </p:sp>
       <p:cxnSp>
         <p:nvCxnSpPr>
           <p:cNvPr id="41" name="Straight Connector 40">
@@ -4389,6 +4268,466 @@
 </file>
 
 <file path=ppt/slides/slide4.xml><?xml version="1.0" encoding="utf-8"?>
+<p:sld xmlns:a="http://schemas.openxmlformats.org/drawingml/2006/main" xmlns:r="http://schemas.openxmlformats.org/officeDocument/2006/relationships" xmlns:p="http://schemas.openxmlformats.org/presentationml/2006/main">
+  <p:cSld>
+    <p:spTree>
+      <p:nvGrpSpPr>
+        <p:cNvPr id="1" name=""/>
+        <p:cNvGrpSpPr/>
+        <p:nvPr/>
+      </p:nvGrpSpPr>
+      <p:grpSpPr>
+        <a:xfrm>
+          <a:off x="0" y="0"/>
+          <a:ext cx="0" cy="0"/>
+          <a:chOff x="0" y="0"/>
+          <a:chExt cx="0" cy="0"/>
+        </a:xfrm>
+      </p:grpSpPr>
+      <p:sp>
+        <p:nvSpPr>
+          <p:cNvPr id="2" name="Oval 1">
+            <a:extLst>
+              <a:ext uri="{FF2B5EF4-FFF2-40B4-BE49-F238E27FC236}">
+                <a16:creationId xmlns:a16="http://schemas.microsoft.com/office/drawing/2014/main" id="{544AFA55-7520-E44F-B020-6D9B0B632651}"/>
+              </a:ext>
+            </a:extLst>
+          </p:cNvPr>
+          <p:cNvSpPr/>
+          <p:nvPr/>
+        </p:nvSpPr>
+        <p:spPr>
+          <a:xfrm>
+            <a:off x="1944895" y="4081515"/>
+            <a:ext cx="2665141" cy="1471961"/>
+          </a:xfrm>
+          <a:prstGeom prst="ellipse">
+            <a:avLst/>
+          </a:prstGeom>
+          <a:noFill/>
+          <a:ln w="25400">
+            <a:solidFill>
+              <a:schemeClr val="tx1"/>
+            </a:solidFill>
+          </a:ln>
+        </p:spPr>
+        <p:style>
+          <a:lnRef idx="2">
+            <a:schemeClr val="accent1">
+              <a:shade val="50000"/>
+            </a:schemeClr>
+          </a:lnRef>
+          <a:fillRef idx="1">
+            <a:schemeClr val="accent1"/>
+          </a:fillRef>
+          <a:effectRef idx="0">
+            <a:schemeClr val="accent1"/>
+          </a:effectRef>
+          <a:fontRef idx="minor">
+            <a:schemeClr val="lt1"/>
+          </a:fontRef>
+        </p:style>
+        <p:txBody>
+          <a:bodyPr rtlCol="0" anchor="ctr"/>
+          <a:lstStyle/>
+          <a:p>
+            <a:pPr algn="ctr"/>
+            <a:r>
+              <a:rPr lang="en-US" sz="3200" dirty="0">
+                <a:solidFill>
+                  <a:schemeClr val="tx1"/>
+                </a:solidFill>
+              </a:rPr>
+              <a:t>Economic</a:t>
+            </a:r>
+          </a:p>
+        </p:txBody>
+      </p:sp>
+      <p:sp>
+        <p:nvSpPr>
+          <p:cNvPr id="10" name="Oval 9">
+            <a:extLst>
+              <a:ext uri="{FF2B5EF4-FFF2-40B4-BE49-F238E27FC236}">
+                <a16:creationId xmlns:a16="http://schemas.microsoft.com/office/drawing/2014/main" id="{6B7C7E2C-CF6E-6142-910E-E4A4E622C77C}"/>
+              </a:ext>
+            </a:extLst>
+          </p:cNvPr>
+          <p:cNvSpPr/>
+          <p:nvPr/>
+        </p:nvSpPr>
+        <p:spPr>
+          <a:xfrm>
+            <a:off x="7275177" y="4081516"/>
+            <a:ext cx="2665141" cy="1471961"/>
+          </a:xfrm>
+          <a:prstGeom prst="ellipse">
+            <a:avLst/>
+          </a:prstGeom>
+          <a:noFill/>
+          <a:ln w="25400">
+            <a:solidFill>
+              <a:schemeClr val="tx1"/>
+            </a:solidFill>
+          </a:ln>
+        </p:spPr>
+        <p:style>
+          <a:lnRef idx="2">
+            <a:schemeClr val="accent1">
+              <a:shade val="50000"/>
+            </a:schemeClr>
+          </a:lnRef>
+          <a:fillRef idx="1">
+            <a:schemeClr val="accent1"/>
+          </a:fillRef>
+          <a:effectRef idx="0">
+            <a:schemeClr val="accent1"/>
+          </a:effectRef>
+          <a:fontRef idx="minor">
+            <a:schemeClr val="lt1"/>
+          </a:fontRef>
+        </p:style>
+        <p:txBody>
+          <a:bodyPr rtlCol="0" anchor="ctr"/>
+          <a:lstStyle/>
+          <a:p>
+            <a:pPr algn="ctr"/>
+            <a:r>
+              <a:rPr lang="en-US" sz="3200" dirty="0">
+                <a:solidFill>
+                  <a:schemeClr val="tx1"/>
+                </a:solidFill>
+              </a:rPr>
+              <a:t>Social</a:t>
+            </a:r>
+          </a:p>
+        </p:txBody>
+      </p:sp>
+      <p:sp>
+        <p:nvSpPr>
+          <p:cNvPr id="11" name="Oval 10">
+            <a:extLst>
+              <a:ext uri="{FF2B5EF4-FFF2-40B4-BE49-F238E27FC236}">
+                <a16:creationId xmlns:a16="http://schemas.microsoft.com/office/drawing/2014/main" id="{D9056F06-7A62-9B4F-84C0-BCB5123A16B2}"/>
+              </a:ext>
+            </a:extLst>
+          </p:cNvPr>
+          <p:cNvSpPr/>
+          <p:nvPr/>
+        </p:nvSpPr>
+        <p:spPr>
+          <a:xfrm>
+            <a:off x="4110958" y="604672"/>
+            <a:ext cx="3676682" cy="1471961"/>
+          </a:xfrm>
+          <a:prstGeom prst="ellipse">
+            <a:avLst/>
+          </a:prstGeom>
+          <a:noFill/>
+          <a:ln w="25400">
+            <a:solidFill>
+              <a:schemeClr val="tx1"/>
+            </a:solidFill>
+          </a:ln>
+        </p:spPr>
+        <p:style>
+          <a:lnRef idx="2">
+            <a:schemeClr val="accent1">
+              <a:shade val="50000"/>
+            </a:schemeClr>
+          </a:lnRef>
+          <a:fillRef idx="1">
+            <a:schemeClr val="accent1"/>
+          </a:fillRef>
+          <a:effectRef idx="0">
+            <a:schemeClr val="accent1"/>
+          </a:effectRef>
+          <a:fontRef idx="minor">
+            <a:schemeClr val="lt1"/>
+          </a:fontRef>
+        </p:style>
+        <p:txBody>
+          <a:bodyPr rtlCol="0" anchor="ctr"/>
+          <a:lstStyle/>
+          <a:p>
+            <a:pPr algn="ctr"/>
+            <a:r>
+              <a:rPr lang="en-US" sz="3200" dirty="0">
+                <a:solidFill>
+                  <a:schemeClr val="tx1"/>
+                </a:solidFill>
+              </a:rPr>
+              <a:t>Environmental</a:t>
+            </a:r>
+          </a:p>
+        </p:txBody>
+      </p:sp>
+      <p:cxnSp>
+        <p:nvCxnSpPr>
+          <p:cNvPr id="15" name="Straight Connector 14">
+            <a:extLst>
+              <a:ext uri="{FF2B5EF4-FFF2-40B4-BE49-F238E27FC236}">
+                <a16:creationId xmlns:a16="http://schemas.microsoft.com/office/drawing/2014/main" id="{1A71F56A-BFE9-8942-85AA-CB837D79D21E}"/>
+              </a:ext>
+            </a:extLst>
+          </p:cNvPr>
+          <p:cNvCxnSpPr>
+            <a:cxnSpLocks/>
+          </p:cNvCxnSpPr>
+          <p:nvPr/>
+        </p:nvCxnSpPr>
+        <p:spPr>
+          <a:xfrm>
+            <a:off x="6596997" y="2047065"/>
+            <a:ext cx="1402016" cy="2116200"/>
+          </a:xfrm>
+          <a:prstGeom prst="line">
+            <a:avLst/>
+          </a:prstGeom>
+          <a:ln>
+            <a:solidFill>
+              <a:schemeClr val="tx1"/>
+            </a:solidFill>
+          </a:ln>
+        </p:spPr>
+        <p:style>
+          <a:lnRef idx="1">
+            <a:schemeClr val="accent1"/>
+          </a:lnRef>
+          <a:fillRef idx="0">
+            <a:schemeClr val="accent1"/>
+          </a:fillRef>
+          <a:effectRef idx="0">
+            <a:schemeClr val="accent1"/>
+          </a:effectRef>
+          <a:fontRef idx="minor">
+            <a:schemeClr val="tx1"/>
+          </a:fontRef>
+        </p:style>
+      </p:cxnSp>
+      <p:sp>
+        <p:nvSpPr>
+          <p:cNvPr id="24" name="TextBox 23">
+            <a:extLst>
+              <a:ext uri="{FF2B5EF4-FFF2-40B4-BE49-F238E27FC236}">
+                <a16:creationId xmlns:a16="http://schemas.microsoft.com/office/drawing/2014/main" id="{DC4CC64C-F18A-7348-8216-1650E341F102}"/>
+              </a:ext>
+            </a:extLst>
+          </p:cNvPr>
+          <p:cNvSpPr txBox="1"/>
+          <p:nvPr/>
+        </p:nvSpPr>
+        <p:spPr>
+          <a:xfrm>
+            <a:off x="4851282" y="4748617"/>
+            <a:ext cx="2182650" cy="461665"/>
+          </a:xfrm>
+          <a:prstGeom prst="rect">
+            <a:avLst/>
+          </a:prstGeom>
+          <a:noFill/>
+        </p:spPr>
+        <p:txBody>
+          <a:bodyPr wrap="none" rtlCol="0">
+            <a:spAutoFit/>
+          </a:bodyPr>
+          <a:lstStyle/>
+          <a:p>
+            <a:pPr algn="ctr"/>
+            <a:r>
+              <a:rPr lang="en-US" sz="2400" dirty="0"/>
+              <a:t>Socioeconomics</a:t>
+            </a:r>
+          </a:p>
+        </p:txBody>
+      </p:sp>
+      <p:sp>
+        <p:nvSpPr>
+          <p:cNvPr id="25" name="TextBox 24">
+            <a:extLst>
+              <a:ext uri="{FF2B5EF4-FFF2-40B4-BE49-F238E27FC236}">
+                <a16:creationId xmlns:a16="http://schemas.microsoft.com/office/drawing/2014/main" id="{989C5124-2802-AD49-8376-757FC8E5D2C5}"/>
+              </a:ext>
+            </a:extLst>
+          </p:cNvPr>
+          <p:cNvSpPr txBox="1"/>
+          <p:nvPr/>
+        </p:nvSpPr>
+        <p:spPr>
+          <a:xfrm rot="3363220">
+            <a:off x="6352332" y="2699145"/>
+            <a:ext cx="2003369" cy="830997"/>
+          </a:xfrm>
+          <a:prstGeom prst="rect">
+            <a:avLst/>
+          </a:prstGeom>
+          <a:noFill/>
+        </p:spPr>
+        <p:txBody>
+          <a:bodyPr wrap="none" rtlCol="0">
+            <a:spAutoFit/>
+          </a:bodyPr>
+          <a:lstStyle/>
+          <a:p>
+            <a:pPr algn="ctr"/>
+            <a:r>
+              <a:rPr lang="en-US" sz="2400" dirty="0"/>
+              <a:t>Environmental</a:t>
+            </a:r>
+          </a:p>
+          <a:p>
+            <a:pPr algn="ctr"/>
+            <a:r>
+              <a:rPr lang="en-US" sz="2400" dirty="0"/>
+              <a:t>Sociology</a:t>
+            </a:r>
+          </a:p>
+        </p:txBody>
+      </p:sp>
+      <p:sp>
+        <p:nvSpPr>
+          <p:cNvPr id="26" name="TextBox 25">
+            <a:extLst>
+              <a:ext uri="{FF2B5EF4-FFF2-40B4-BE49-F238E27FC236}">
+                <a16:creationId xmlns:a16="http://schemas.microsoft.com/office/drawing/2014/main" id="{A0AFE7E9-40B2-1549-BC81-15EB96C74D4C}"/>
+              </a:ext>
+            </a:extLst>
+          </p:cNvPr>
+          <p:cNvSpPr txBox="1"/>
+          <p:nvPr/>
+        </p:nvSpPr>
+        <p:spPr>
+          <a:xfrm rot="18177679">
+            <a:off x="3546952" y="2722765"/>
+            <a:ext cx="2003369" cy="830997"/>
+          </a:xfrm>
+          <a:prstGeom prst="rect">
+            <a:avLst/>
+          </a:prstGeom>
+          <a:noFill/>
+        </p:spPr>
+        <p:txBody>
+          <a:bodyPr wrap="none" rtlCol="0">
+            <a:spAutoFit/>
+          </a:bodyPr>
+          <a:lstStyle/>
+          <a:p>
+            <a:pPr algn="ctr"/>
+            <a:r>
+              <a:rPr lang="en-US" sz="2400" dirty="0"/>
+              <a:t>Environmental</a:t>
+            </a:r>
+          </a:p>
+          <a:p>
+            <a:pPr algn="ctr"/>
+            <a:r>
+              <a:rPr lang="en-US" sz="2400" dirty="0"/>
+              <a:t>Economics</a:t>
+            </a:r>
+          </a:p>
+        </p:txBody>
+      </p:sp>
+      <p:cxnSp>
+        <p:nvCxnSpPr>
+          <p:cNvPr id="41" name="Straight Connector 40">
+            <a:extLst>
+              <a:ext uri="{FF2B5EF4-FFF2-40B4-BE49-F238E27FC236}">
+                <a16:creationId xmlns:a16="http://schemas.microsoft.com/office/drawing/2014/main" id="{479F05B5-6F77-6D47-96C8-010FCAEF109C}"/>
+              </a:ext>
+            </a:extLst>
+          </p:cNvPr>
+          <p:cNvCxnSpPr>
+            <a:cxnSpLocks/>
+          </p:cNvCxnSpPr>
+          <p:nvPr/>
+        </p:nvCxnSpPr>
+        <p:spPr>
+          <a:xfrm flipH="1">
+            <a:off x="3886200" y="2047065"/>
+            <a:ext cx="1395984" cy="2128182"/>
+          </a:xfrm>
+          <a:prstGeom prst="line">
+            <a:avLst/>
+          </a:prstGeom>
+          <a:ln>
+            <a:solidFill>
+              <a:schemeClr val="tx1"/>
+            </a:solidFill>
+          </a:ln>
+        </p:spPr>
+        <p:style>
+          <a:lnRef idx="1">
+            <a:schemeClr val="accent1"/>
+          </a:lnRef>
+          <a:fillRef idx="0">
+            <a:schemeClr val="accent1"/>
+          </a:fillRef>
+          <a:effectRef idx="0">
+            <a:schemeClr val="accent1"/>
+          </a:effectRef>
+          <a:fontRef idx="minor">
+            <a:schemeClr val="tx1"/>
+          </a:fontRef>
+        </p:style>
+      </p:cxnSp>
+      <p:cxnSp>
+        <p:nvCxnSpPr>
+          <p:cNvPr id="42" name="Straight Connector 41">
+            <a:extLst>
+              <a:ext uri="{FF2B5EF4-FFF2-40B4-BE49-F238E27FC236}">
+                <a16:creationId xmlns:a16="http://schemas.microsoft.com/office/drawing/2014/main" id="{DA2A4179-2896-6445-BC03-1D53EB9E756B}"/>
+              </a:ext>
+            </a:extLst>
+          </p:cNvPr>
+          <p:cNvCxnSpPr>
+            <a:cxnSpLocks/>
+            <a:stCxn id="2" idx="6"/>
+            <a:endCxn id="10" idx="2"/>
+          </p:cNvCxnSpPr>
+          <p:nvPr/>
+        </p:nvCxnSpPr>
+        <p:spPr>
+          <a:xfrm>
+            <a:off x="4610036" y="4817496"/>
+            <a:ext cx="2665141" cy="1"/>
+          </a:xfrm>
+          <a:prstGeom prst="line">
+            <a:avLst/>
+          </a:prstGeom>
+          <a:ln>
+            <a:solidFill>
+              <a:schemeClr val="tx1"/>
+            </a:solidFill>
+          </a:ln>
+        </p:spPr>
+        <p:style>
+          <a:lnRef idx="1">
+            <a:schemeClr val="accent1"/>
+          </a:lnRef>
+          <a:fillRef idx="0">
+            <a:schemeClr val="accent1"/>
+          </a:fillRef>
+          <a:effectRef idx="0">
+            <a:schemeClr val="accent1"/>
+          </a:effectRef>
+          <a:fontRef idx="minor">
+            <a:schemeClr val="tx1"/>
+          </a:fontRef>
+        </p:style>
+      </p:cxnSp>
+    </p:spTree>
+    <p:extLst>
+      <p:ext uri="{BB962C8B-B14F-4D97-AF65-F5344CB8AC3E}">
+        <p14:creationId xmlns:p14="http://schemas.microsoft.com/office/powerpoint/2010/main" val="2665525580"/>
+      </p:ext>
+    </p:extLst>
+  </p:cSld>
+  <p:clrMapOvr>
+    <a:masterClrMapping/>
+  </p:clrMapOvr>
+</p:sld>
+</file>
+
+<file path=ppt/slides/slide5.xml><?xml version="1.0" encoding="utf-8"?>
 <p:sld xmlns:a="http://schemas.openxmlformats.org/drawingml/2006/main" xmlns:r="http://schemas.openxmlformats.org/officeDocument/2006/relationships" xmlns:p="http://schemas.openxmlformats.org/presentationml/2006/main">
   <p:cSld>
     <p:spTree>

</xml_diff>

<commit_message>
Got up to worldviews.
</commit_message>
<xml_diff>
--- a/figure_other/Figures.pptx
+++ b/figure_other/Figures.pptx
@@ -4769,6 +4769,9 @@
               <a:lumMod val="75000"/>
             </a:schemeClr>
           </a:solidFill>
+          <a:ln>
+            <a:noFill/>
+          </a:ln>
         </p:spPr>
         <p:style>
           <a:lnRef idx="2">
@@ -4808,7 +4811,7 @@
                   <a:schemeClr val="tx1"/>
                 </a:solidFill>
               </a:rPr>
-              <a:t>Religion, and </a:t>
+              <a:t>Religions, </a:t>
             </a:r>
           </a:p>
           <a:p>
@@ -4819,7 +4822,18 @@
                   <a:schemeClr val="tx1"/>
                 </a:solidFill>
               </a:rPr>
-              <a:t>Theologies</a:t>
+              <a:t>Theologies, </a:t>
+            </a:r>
+          </a:p>
+          <a:p>
+            <a:pPr algn="r"/>
+            <a:r>
+              <a:rPr lang="en-US" sz="2400" dirty="0">
+                <a:solidFill>
+                  <a:schemeClr val="tx1"/>
+                </a:solidFill>
+              </a:rPr>
+              <a:t>and Ethics</a:t>
             </a:r>
           </a:p>
         </p:txBody>

</xml_diff>